<commit_message>
Titel farbig gemacht, Content eingefügt
</commit_message>
<xml_diff>
--- a/doc/task01/Task1.pptx
+++ b/doc/task01/Task1.pptx
@@ -6,7 +6,7 @@
   </p:sldMasterIdLst>
   <p:sldIdLst>
     <p:sldId id="256" r:id="rId2"/>
-    <p:sldId id="257" r:id="rId3"/>
+    <p:sldId id="261" r:id="rId3"/>
     <p:sldId id="258" r:id="rId4"/>
     <p:sldId id="259" r:id="rId5"/>
     <p:sldId id="260" r:id="rId6"/>
@@ -108,6 +108,11 @@
       </a:defRPr>
     </a:lvl9pPr>
   </p:defaultTextStyle>
+  <p:extLst>
+    <p:ext uri="{EFAFB233-063F-42B5-8137-9DF3F51BA10A}">
+      <p15:sldGuideLst xmlns:p15="http://schemas.microsoft.com/office/powerpoint/2012/main"/>
+    </p:ext>
+  </p:extLst>
 </p:presentation>
 </file>
 
@@ -242,7 +247,7 @@
           <a:p>
             <a:fld id="{F3305D74-5386-41FC-BB92-843EF180690E}" type="datetimeFigureOut">
               <a:rPr lang="de-CH" smtClean="0"/>
-              <a:t>24.09.2015</a:t>
+              <a:t>25.09.2015</a:t>
             </a:fld>
             <a:endParaRPr lang="de-CH"/>
           </a:p>
@@ -412,7 +417,7 @@
           <a:p>
             <a:fld id="{F3305D74-5386-41FC-BB92-843EF180690E}" type="datetimeFigureOut">
               <a:rPr lang="de-CH" smtClean="0"/>
-              <a:t>24.09.2015</a:t>
+              <a:t>25.09.2015</a:t>
             </a:fld>
             <a:endParaRPr lang="de-CH"/>
           </a:p>
@@ -592,7 +597,7 @@
           <a:p>
             <a:fld id="{F3305D74-5386-41FC-BB92-843EF180690E}" type="datetimeFigureOut">
               <a:rPr lang="de-CH" smtClean="0"/>
-              <a:t>24.09.2015</a:t>
+              <a:t>25.09.2015</a:t>
             </a:fld>
             <a:endParaRPr lang="de-CH"/>
           </a:p>
@@ -762,7 +767,7 @@
           <a:p>
             <a:fld id="{F3305D74-5386-41FC-BB92-843EF180690E}" type="datetimeFigureOut">
               <a:rPr lang="de-CH" smtClean="0"/>
-              <a:t>24.09.2015</a:t>
+              <a:t>25.09.2015</a:t>
             </a:fld>
             <a:endParaRPr lang="de-CH"/>
           </a:p>
@@ -1008,7 +1013,7 @@
           <a:p>
             <a:fld id="{F3305D74-5386-41FC-BB92-843EF180690E}" type="datetimeFigureOut">
               <a:rPr lang="de-CH" smtClean="0"/>
-              <a:t>24.09.2015</a:t>
+              <a:t>25.09.2015</a:t>
             </a:fld>
             <a:endParaRPr lang="de-CH"/>
           </a:p>
@@ -1240,7 +1245,7 @@
           <a:p>
             <a:fld id="{F3305D74-5386-41FC-BB92-843EF180690E}" type="datetimeFigureOut">
               <a:rPr lang="de-CH" smtClean="0"/>
-              <a:t>24.09.2015</a:t>
+              <a:t>25.09.2015</a:t>
             </a:fld>
             <a:endParaRPr lang="de-CH"/>
           </a:p>
@@ -1607,7 +1612,7 @@
           <a:p>
             <a:fld id="{F3305D74-5386-41FC-BB92-843EF180690E}" type="datetimeFigureOut">
               <a:rPr lang="de-CH" smtClean="0"/>
-              <a:t>24.09.2015</a:t>
+              <a:t>25.09.2015</a:t>
             </a:fld>
             <a:endParaRPr lang="de-CH"/>
           </a:p>
@@ -1725,7 +1730,7 @@
           <a:p>
             <a:fld id="{F3305D74-5386-41FC-BB92-843EF180690E}" type="datetimeFigureOut">
               <a:rPr lang="de-CH" smtClean="0"/>
-              <a:t>24.09.2015</a:t>
+              <a:t>25.09.2015</a:t>
             </a:fld>
             <a:endParaRPr lang="de-CH"/>
           </a:p>
@@ -1820,7 +1825,7 @@
           <a:p>
             <a:fld id="{F3305D74-5386-41FC-BB92-843EF180690E}" type="datetimeFigureOut">
               <a:rPr lang="de-CH" smtClean="0"/>
-              <a:t>24.09.2015</a:t>
+              <a:t>25.09.2015</a:t>
             </a:fld>
             <a:endParaRPr lang="de-CH"/>
           </a:p>
@@ -2097,7 +2102,7 @@
           <a:p>
             <a:fld id="{F3305D74-5386-41FC-BB92-843EF180690E}" type="datetimeFigureOut">
               <a:rPr lang="de-CH" smtClean="0"/>
-              <a:t>24.09.2015</a:t>
+              <a:t>25.09.2015</a:t>
             </a:fld>
             <a:endParaRPr lang="de-CH"/>
           </a:p>
@@ -2350,7 +2355,7 @@
           <a:p>
             <a:fld id="{F3305D74-5386-41FC-BB92-843EF180690E}" type="datetimeFigureOut">
               <a:rPr lang="de-CH" smtClean="0"/>
-              <a:t>24.09.2015</a:t>
+              <a:t>25.09.2015</a:t>
             </a:fld>
             <a:endParaRPr lang="de-CH"/>
           </a:p>
@@ -2563,7 +2568,7 @@
           <a:p>
             <a:fld id="{F3305D74-5386-41FC-BB92-843EF180690E}" type="datetimeFigureOut">
               <a:rPr lang="de-CH" smtClean="0"/>
-              <a:t>24.09.2015</a:t>
+              <a:t>25.09.2015</a:t>
             </a:fld>
             <a:endParaRPr lang="de-CH"/>
           </a:p>
@@ -2980,11 +2985,13 @@
         </p:nvSpPr>
         <p:spPr/>
         <p:txBody>
-          <a:bodyPr/>
-          <a:lstStyle/>
-          <a:p>
-            <a:r>
-              <a:rPr lang="de-CH" b="1" dirty="0" smtClean="0">
+          <a:bodyPr>
+            <a:normAutofit/>
+          </a:bodyPr>
+          <a:lstStyle/>
+          <a:p>
+            <a:r>
+              <a:rPr lang="de-CH" sz="7200" b="1" dirty="0" smtClean="0">
                 <a:solidFill>
                   <a:srgbClr val="00B050"/>
                 </a:solidFill>
@@ -2998,7 +3005,7 @@
               </a:rPr>
               <a:t>Team Green</a:t>
             </a:r>
-            <a:endParaRPr lang="de-CH" b="1" dirty="0">
+            <a:endParaRPr lang="de-CH" sz="7200" b="1" dirty="0">
               <a:solidFill>
                 <a:srgbClr val="00B050"/>
               </a:solidFill>
@@ -3025,20 +3032,22 @@
         </p:nvSpPr>
         <p:spPr/>
         <p:txBody>
-          <a:bodyPr/>
-          <a:lstStyle/>
-          <a:p>
-            <a:r>
-              <a:rPr lang="de-CH" dirty="0" smtClean="0"/>
+          <a:bodyPr>
+            <a:normAutofit/>
+          </a:bodyPr>
+          <a:lstStyle/>
+          <a:p>
+            <a:r>
+              <a:rPr lang="de-CH" sz="3200" dirty="0" smtClean="0"/>
               <a:t>Task 1 – First Analysis</a:t>
             </a:r>
           </a:p>
           <a:p>
             <a:r>
-              <a:rPr lang="de-CH" dirty="0" smtClean="0"/>
+              <a:rPr lang="de-CH" sz="3200" dirty="0" smtClean="0"/>
               <a:t>Projekt MHC-PMS</a:t>
             </a:r>
-            <a:endParaRPr lang="de-CH" dirty="0"/>
+            <a:endParaRPr lang="de-CH" sz="3200" dirty="0"/>
           </a:p>
         </p:txBody>
       </p:sp>
@@ -3087,33 +3096,64 @@
           <a:bodyPr/>
           <a:lstStyle/>
           <a:p>
-            <a:pPr algn="ctr"/>
+            <a:r>
+              <a:rPr lang="de-CH" b="1" dirty="0" smtClean="0">
+                <a:solidFill>
+                  <a:srgbClr val="00B050"/>
+                </a:solidFill>
+              </a:rPr>
+              <a:t>Content</a:t>
+            </a:r>
+            <a:endParaRPr lang="de-CH" b="1" dirty="0">
+              <a:solidFill>
+                <a:srgbClr val="00B050"/>
+              </a:solidFill>
+            </a:endParaRPr>
+          </a:p>
+        </p:txBody>
+      </p:sp>
+      <p:sp>
+        <p:nvSpPr>
+          <p:cNvPr id="3" name="Inhaltsplatzhalter 2"/>
+          <p:cNvSpPr>
+            <a:spLocks noGrp="1"/>
+          </p:cNvSpPr>
+          <p:nvPr>
+            <p:ph idx="1"/>
+          </p:nvPr>
+        </p:nvSpPr>
+        <p:spPr/>
+        <p:txBody>
+          <a:bodyPr/>
+          <a:lstStyle/>
+          <a:p>
             <a:r>
               <a:rPr lang="de-CH" dirty="0" smtClean="0"/>
-              <a:t>Project MHC-PMS</a:t>
-            </a:r>
-            <a:endParaRPr lang="de-CH" dirty="0"/>
-          </a:p>
-        </p:txBody>
-      </p:sp>
-      <p:sp>
-        <p:nvSpPr>
-          <p:cNvPr id="3" name="Inhaltsplatzhalter 2"/>
-          <p:cNvSpPr>
-            <a:spLocks noGrp="1"/>
-          </p:cNvSpPr>
-          <p:nvPr>
-            <p:ph idx="1"/>
-          </p:nvPr>
-        </p:nvSpPr>
-        <p:spPr/>
-        <p:txBody>
-          <a:bodyPr/>
-          <a:lstStyle/>
+              <a:t>Target Users</a:t>
+            </a:r>
+          </a:p>
           <a:p>
             <a:r>
               <a:rPr lang="de-CH" dirty="0" smtClean="0"/>
-              <a:t>First Analysis</a:t>
+              <a:t>Key Features</a:t>
+            </a:r>
+          </a:p>
+          <a:p>
+            <a:r>
+              <a:rPr lang="de-CH" dirty="0" smtClean="0"/>
+              <a:t>Critical </a:t>
+            </a:r>
+            <a:r>
+              <a:rPr lang="de-CH" dirty="0" err="1" smtClean="0"/>
+              <a:t>Success</a:t>
+            </a:r>
+            <a:r>
+              <a:rPr lang="de-CH" dirty="0" smtClean="0"/>
+              <a:t> </a:t>
+            </a:r>
+            <a:r>
+              <a:rPr lang="de-CH" dirty="0" err="1" smtClean="0"/>
+              <a:t>Factors</a:t>
             </a:r>
             <a:endParaRPr lang="de-CH" dirty="0"/>
           </a:p>
@@ -3122,7 +3162,7 @@
     </p:spTree>
     <p:extLst>
       <p:ext uri="{BB962C8B-B14F-4D97-AF65-F5344CB8AC3E}">
-        <p14:creationId xmlns:p14="http://schemas.microsoft.com/office/powerpoint/2010/main" val="3864644875"/>
+        <p14:creationId xmlns:p14="http://schemas.microsoft.com/office/powerpoint/2010/main" val="1365381471"/>
       </p:ext>
     </p:extLst>
   </p:cSld>
@@ -3165,10 +3205,18 @@
           <a:lstStyle/>
           <a:p>
             <a:r>
-              <a:rPr lang="de-CH" dirty="0" smtClean="0"/>
+              <a:rPr lang="de-CH" b="1" dirty="0" smtClean="0">
+                <a:solidFill>
+                  <a:srgbClr val="00B050"/>
+                </a:solidFill>
+              </a:rPr>
               <a:t>1. Target Users</a:t>
             </a:r>
-            <a:endParaRPr lang="de-CH" dirty="0"/>
+            <a:endParaRPr lang="de-CH" b="1" dirty="0">
+              <a:solidFill>
+                <a:srgbClr val="00B050"/>
+              </a:solidFill>
+            </a:endParaRPr>
           </a:p>
         </p:txBody>
       </p:sp>
@@ -3345,34 +3393,66 @@
           <a:lstStyle/>
           <a:p>
             <a:r>
-              <a:rPr lang="de-CH" dirty="0" smtClean="0"/>
+              <a:rPr lang="de-CH" b="1" dirty="0" smtClean="0">
+                <a:solidFill>
+                  <a:srgbClr val="00B050"/>
+                </a:solidFill>
+              </a:rPr>
               <a:t>2. Key Features (</a:t>
             </a:r>
             <a:r>
-              <a:rPr lang="de-CH" dirty="0" err="1" smtClean="0"/>
+              <a:rPr lang="de-CH" b="1" dirty="0" err="1" smtClean="0">
+                <a:solidFill>
+                  <a:srgbClr val="00B050"/>
+                </a:solidFill>
+              </a:rPr>
               <a:t>from</a:t>
             </a:r>
             <a:r>
-              <a:rPr lang="de-CH" dirty="0" smtClean="0"/>
+              <a:rPr lang="de-CH" b="1" dirty="0" smtClean="0">
+                <a:solidFill>
+                  <a:srgbClr val="00B050"/>
+                </a:solidFill>
+              </a:rPr>
               <a:t> </a:t>
             </a:r>
             <a:r>
-              <a:rPr lang="de-CH" dirty="0" err="1" smtClean="0"/>
+              <a:rPr lang="de-CH" b="1" dirty="0" err="1" smtClean="0">
+                <a:solidFill>
+                  <a:srgbClr val="00B050"/>
+                </a:solidFill>
+              </a:rPr>
               <a:t>users</a:t>
             </a:r>
             <a:r>
-              <a:rPr lang="de-CH" dirty="0" smtClean="0"/>
+              <a:rPr lang="de-CH" b="1" dirty="0" smtClean="0">
+                <a:solidFill>
+                  <a:srgbClr val="00B050"/>
+                </a:solidFill>
+              </a:rPr>
               <a:t> </a:t>
             </a:r>
             <a:r>
-              <a:rPr lang="de-CH" dirty="0" err="1" smtClean="0"/>
+              <a:rPr lang="de-CH" b="1" dirty="0" err="1" smtClean="0">
+                <a:solidFill>
+                  <a:srgbClr val="00B050"/>
+                </a:solidFill>
+              </a:rPr>
               <a:t>perspective</a:t>
             </a:r>
             <a:r>
-              <a:rPr lang="de-CH" dirty="0" smtClean="0"/>
+              <a:rPr lang="de-CH" b="1" dirty="0" smtClean="0">
+                <a:solidFill>
+                  <a:srgbClr val="00B050"/>
+                </a:solidFill>
+              </a:rPr>
               <a:t>)</a:t>
             </a:r>
-            <a:endParaRPr lang="de-CH" dirty="0"/>
+            <a:endParaRPr lang="de-CH" b="1" dirty="0">
+              <a:solidFill>
+                <a:srgbClr val="00B050"/>
+              </a:solidFill>
+            </a:endParaRPr>
           </a:p>
         </p:txBody>
       </p:sp>
@@ -3491,22 +3571,42 @@
           <a:lstStyle/>
           <a:p>
             <a:r>
-              <a:rPr lang="de-CH" dirty="0" smtClean="0"/>
+              <a:rPr lang="de-CH" b="1" dirty="0" smtClean="0">
+                <a:solidFill>
+                  <a:srgbClr val="00B050"/>
+                </a:solidFill>
+              </a:rPr>
               <a:t>3. Critical </a:t>
             </a:r>
             <a:r>
-              <a:rPr lang="de-CH" dirty="0" err="1" smtClean="0"/>
+              <a:rPr lang="de-CH" b="1" dirty="0" err="1" smtClean="0">
+                <a:solidFill>
+                  <a:srgbClr val="00B050"/>
+                </a:solidFill>
+              </a:rPr>
               <a:t>Success</a:t>
             </a:r>
             <a:r>
-              <a:rPr lang="de-CH" dirty="0" smtClean="0"/>
+              <a:rPr lang="de-CH" b="1" dirty="0" smtClean="0">
+                <a:solidFill>
+                  <a:srgbClr val="00B050"/>
+                </a:solidFill>
+              </a:rPr>
               <a:t> </a:t>
             </a:r>
             <a:r>
-              <a:rPr lang="de-CH" dirty="0" err="1" smtClean="0"/>
-              <a:t>Factor</a:t>
-            </a:r>
-            <a:endParaRPr lang="de-CH" dirty="0"/>
+              <a:rPr lang="de-CH" b="1" dirty="0" err="1" smtClean="0">
+                <a:solidFill>
+                  <a:srgbClr val="00B050"/>
+                </a:solidFill>
+              </a:rPr>
+              <a:t>Factors</a:t>
+            </a:r>
+            <a:endParaRPr lang="de-CH" b="1" dirty="0">
+              <a:solidFill>
+                <a:srgbClr val="00B050"/>
+              </a:solidFill>
+            </a:endParaRPr>
           </a:p>
         </p:txBody>
       </p:sp>
@@ -3523,7 +3623,7 @@
         <p:spPr/>
         <p:txBody>
           <a:bodyPr>
-            <a:normAutofit fontScale="92500" lnSpcReduction="10000"/>
+            <a:normAutofit fontScale="92500" lnSpcReduction="20000"/>
           </a:bodyPr>
           <a:lstStyle/>
           <a:p>
@@ -3578,6 +3678,13 @@
               <a:rPr lang="de-CH" dirty="0" smtClean="0"/>
               <a:t>Kommunikation</a:t>
             </a:r>
+          </a:p>
+          <a:p>
+            <a:r>
+              <a:rPr lang="de-CH" dirty="0" smtClean="0"/>
+              <a:t>Time Management</a:t>
+            </a:r>
+            <a:endParaRPr lang="de-CH" dirty="0" smtClean="0"/>
           </a:p>
           <a:p>
             <a:r>

</xml_diff>

<commit_message>
Änderung Critical success factors
</commit_message>
<xml_diff>
--- a/doc/task01/Task1.pptx
+++ b/doc/task01/Task1.pptx
@@ -3546,7 +3546,6 @@
               <a:rPr lang="de-CH" dirty="0" smtClean="0"/>
               <a:t>ungefährlich</a:t>
             </a:r>
-            <a:endParaRPr lang="de-CH" dirty="0" smtClean="0"/>
           </a:p>
           <a:p>
             <a:endParaRPr lang="de-CH" dirty="0"/>
@@ -3703,15 +3702,17 @@
           </a:p>
           <a:p>
             <a:r>
+              <a:rPr lang="de-CH" smtClean="0"/>
+              <a:t>Kommunikation im Team</a:t>
+            </a:r>
+            <a:endParaRPr lang="de-CH" dirty="0" smtClean="0"/>
+          </a:p>
+          <a:p>
+            <a:r>
               <a:rPr lang="de-CH" dirty="0" smtClean="0"/>
-              <a:t>Kommunikation</a:t>
-            </a:r>
-          </a:p>
-          <a:p>
-            <a:r>
-              <a:rPr lang="de-CH" dirty="0" smtClean="0"/>
-              <a:t>Time Management</a:t>
-            </a:r>
+              <a:t>Zeit Einteilung</a:t>
+            </a:r>
+            <a:endParaRPr lang="de-CH" dirty="0" smtClean="0"/>
           </a:p>
           <a:p>
             <a:r>

</xml_diff>

<commit_message>
Änderung der Key features
</commit_message>
<xml_diff>
--- a/doc/task01/Task1.pptx
+++ b/doc/task01/Task1.pptx
@@ -247,7 +247,7 @@
           <a:p>
             <a:fld id="{F3305D74-5386-41FC-BB92-843EF180690E}" type="datetimeFigureOut">
               <a:rPr lang="de-CH" smtClean="0"/>
-              <a:t>25.09.2015</a:t>
+              <a:t>27.09.2015</a:t>
             </a:fld>
             <a:endParaRPr lang="de-CH"/>
           </a:p>
@@ -417,7 +417,7 @@
           <a:p>
             <a:fld id="{F3305D74-5386-41FC-BB92-843EF180690E}" type="datetimeFigureOut">
               <a:rPr lang="de-CH" smtClean="0"/>
-              <a:t>25.09.2015</a:t>
+              <a:t>27.09.2015</a:t>
             </a:fld>
             <a:endParaRPr lang="de-CH"/>
           </a:p>
@@ -597,7 +597,7 @@
           <a:p>
             <a:fld id="{F3305D74-5386-41FC-BB92-843EF180690E}" type="datetimeFigureOut">
               <a:rPr lang="de-CH" smtClean="0"/>
-              <a:t>25.09.2015</a:t>
+              <a:t>27.09.2015</a:t>
             </a:fld>
             <a:endParaRPr lang="de-CH"/>
           </a:p>
@@ -767,7 +767,7 @@
           <a:p>
             <a:fld id="{F3305D74-5386-41FC-BB92-843EF180690E}" type="datetimeFigureOut">
               <a:rPr lang="de-CH" smtClean="0"/>
-              <a:t>25.09.2015</a:t>
+              <a:t>27.09.2015</a:t>
             </a:fld>
             <a:endParaRPr lang="de-CH"/>
           </a:p>
@@ -1013,7 +1013,7 @@
           <a:p>
             <a:fld id="{F3305D74-5386-41FC-BB92-843EF180690E}" type="datetimeFigureOut">
               <a:rPr lang="de-CH" smtClean="0"/>
-              <a:t>25.09.2015</a:t>
+              <a:t>27.09.2015</a:t>
             </a:fld>
             <a:endParaRPr lang="de-CH"/>
           </a:p>
@@ -1245,7 +1245,7 @@
           <a:p>
             <a:fld id="{F3305D74-5386-41FC-BB92-843EF180690E}" type="datetimeFigureOut">
               <a:rPr lang="de-CH" smtClean="0"/>
-              <a:t>25.09.2015</a:t>
+              <a:t>27.09.2015</a:t>
             </a:fld>
             <a:endParaRPr lang="de-CH"/>
           </a:p>
@@ -1612,7 +1612,7 @@
           <a:p>
             <a:fld id="{F3305D74-5386-41FC-BB92-843EF180690E}" type="datetimeFigureOut">
               <a:rPr lang="de-CH" smtClean="0"/>
-              <a:t>25.09.2015</a:t>
+              <a:t>27.09.2015</a:t>
             </a:fld>
             <a:endParaRPr lang="de-CH"/>
           </a:p>
@@ -1730,7 +1730,7 @@
           <a:p>
             <a:fld id="{F3305D74-5386-41FC-BB92-843EF180690E}" type="datetimeFigureOut">
               <a:rPr lang="de-CH" smtClean="0"/>
-              <a:t>25.09.2015</a:t>
+              <a:t>27.09.2015</a:t>
             </a:fld>
             <a:endParaRPr lang="de-CH"/>
           </a:p>
@@ -1825,7 +1825,7 @@
           <a:p>
             <a:fld id="{F3305D74-5386-41FC-BB92-843EF180690E}" type="datetimeFigureOut">
               <a:rPr lang="de-CH" smtClean="0"/>
-              <a:t>25.09.2015</a:t>
+              <a:t>27.09.2015</a:t>
             </a:fld>
             <a:endParaRPr lang="de-CH"/>
           </a:p>
@@ -2102,7 +2102,7 @@
           <a:p>
             <a:fld id="{F3305D74-5386-41FC-BB92-843EF180690E}" type="datetimeFigureOut">
               <a:rPr lang="de-CH" smtClean="0"/>
-              <a:t>25.09.2015</a:t>
+              <a:t>27.09.2015</a:t>
             </a:fld>
             <a:endParaRPr lang="de-CH"/>
           </a:p>
@@ -2355,7 +2355,7 @@
           <a:p>
             <a:fld id="{F3305D74-5386-41FC-BB92-843EF180690E}" type="datetimeFigureOut">
               <a:rPr lang="de-CH" smtClean="0"/>
-              <a:t>25.09.2015</a:t>
+              <a:t>27.09.2015</a:t>
             </a:fld>
             <a:endParaRPr lang="de-CH"/>
           </a:p>
@@ -2568,7 +2568,7 @@
           <a:p>
             <a:fld id="{F3305D74-5386-41FC-BB92-843EF180690E}" type="datetimeFigureOut">
               <a:rPr lang="de-CH" smtClean="0"/>
-              <a:t>25.09.2015</a:t>
+              <a:t>27.09.2015</a:t>
             </a:fld>
             <a:endParaRPr lang="de-CH"/>
           </a:p>
@@ -3469,38 +3469,42 @@
         <p:spPr/>
         <p:txBody>
           <a:bodyPr>
-            <a:normAutofit fontScale="92500" lnSpcReduction="10000"/>
+            <a:normAutofit/>
           </a:bodyPr>
           <a:lstStyle/>
           <a:p>
             <a:r>
               <a:rPr lang="de-CH" dirty="0" smtClean="0"/>
-              <a:t>Patientenverwaltung (Speziell für Patienten mit psychischen Problemen)</a:t>
+              <a:t>Informationen schnell zur Verfügung stellen</a:t>
             </a:r>
           </a:p>
           <a:p>
             <a:r>
               <a:rPr lang="de-CH" dirty="0" smtClean="0"/>
-              <a:t>Welche Kliniken wurden besucht </a:t>
-            </a:r>
+              <a:t>Einschätzen ob Patient gefährlich ist</a:t>
+            </a:r>
+            <a:endParaRPr lang="de-CH" dirty="0" smtClean="0"/>
           </a:p>
           <a:p>
             <a:r>
               <a:rPr lang="de-CH" dirty="0" smtClean="0"/>
-              <a:t>Kontaktangaben</a:t>
-            </a:r>
-          </a:p>
-          <a:p>
+              <a:t>Krankheitsangaben </a:t>
+            </a:r>
             <a:r>
               <a:rPr lang="de-CH" dirty="0" smtClean="0"/>
-              <a:t>Krankheitsangaben (nur psychische)</a:t>
+              <a:t>(nur psychische)</a:t>
             </a:r>
           </a:p>
           <a:p>
             <a:r>
               <a:rPr lang="de-CH" dirty="0" smtClean="0"/>
-              <a:t>Verlauf der Krankheit</a:t>
-            </a:r>
+              <a:t>Verlauf der </a:t>
+            </a:r>
+            <a:r>
+              <a:rPr lang="de-CH" dirty="0" smtClean="0"/>
+              <a:t>psychischen Erkrankung</a:t>
+            </a:r>
+            <a:endParaRPr lang="de-CH" dirty="0" smtClean="0"/>
           </a:p>
           <a:p>
             <a:r>
@@ -3511,41 +3515,9 @@
           <a:p>
             <a:r>
               <a:rPr lang="de-CH" dirty="0" smtClean="0"/>
-              <a:t>Arztverfügbarkeit</a:t>
-            </a:r>
-          </a:p>
-          <a:p>
-            <a:r>
-              <a:rPr lang="de-CH" dirty="0" smtClean="0"/>
-              <a:t>Einteilung des Patienten</a:t>
-            </a:r>
-          </a:p>
-          <a:p>
-            <a:pPr lvl="1"/>
-            <a:r>
-              <a:rPr lang="de-CH" dirty="0" smtClean="0"/>
-              <a:t>Gefahr für sich selbst oder andere </a:t>
-            </a:r>
-            <a:r>
-              <a:rPr lang="de-CH" dirty="0" smtClean="0">
-                <a:sym typeface="Wingdings" panose="05000000000000000000" pitchFamily="2" charset="2"/>
-              </a:rPr>
-              <a:t> </a:t>
-            </a:r>
-            <a:r>
-              <a:rPr lang="de-CH" smtClean="0">
-                <a:sym typeface="Wingdings" panose="05000000000000000000" pitchFamily="2" charset="2"/>
-              </a:rPr>
-              <a:t>muss eingeliefert sein</a:t>
+              <a:t>Arzt und Klinik Verfügbarkeit</a:t>
             </a:r>
             <a:endParaRPr lang="de-CH" dirty="0" smtClean="0"/>
-          </a:p>
-          <a:p>
-            <a:pPr lvl="1"/>
-            <a:r>
-              <a:rPr lang="de-CH" dirty="0" smtClean="0"/>
-              <a:t>ungefährlich</a:t>
-            </a:r>
           </a:p>
           <a:p>
             <a:endParaRPr lang="de-CH" dirty="0"/>
@@ -3712,7 +3684,6 @@
               <a:rPr lang="de-CH" dirty="0" smtClean="0"/>
               <a:t>Zeit Einteilung</a:t>
             </a:r>
-            <a:endParaRPr lang="de-CH" dirty="0" smtClean="0"/>
           </a:p>
           <a:p>
             <a:r>

</xml_diff>

<commit_message>
final version of task 1
</commit_message>
<xml_diff>
--- a/doc/task01/Task1.pptx
+++ b/doc/task01/Task1.pptx
@@ -111,7 +111,18 @@
   </p:defaultTextStyle>
   <p:extLst>
     <p:ext uri="{EFAFB233-063F-42B5-8137-9DF3F51BA10A}">
-      <p15:sldGuideLst xmlns:p15="http://schemas.microsoft.com/office/powerpoint/2012/main" xmlns=""/>
+      <p15:sldGuideLst xmlns:p15="http://schemas.microsoft.com/office/powerpoint/2012/main">
+        <p15:guide id="1" orient="horz" pos="2160">
+          <p15:clr>
+            <a:srgbClr val="A4A3A4"/>
+          </p15:clr>
+        </p15:guide>
+        <p15:guide id="2" pos="3840">
+          <p15:clr>
+            <a:srgbClr val="A4A3A4"/>
+          </p15:clr>
+        </p15:guide>
+      </p15:sldGuideLst>
     </p:ext>
   </p:extLst>
 </p:presentation>
@@ -248,7 +259,7 @@
           <a:p>
             <a:fld id="{F3305D74-5386-41FC-BB92-843EF180690E}" type="datetimeFigureOut">
               <a:rPr lang="de-CH" smtClean="0"/>
-              <a:t>27.09.2015</a:t>
+              <a:t>28.09.2015</a:t>
             </a:fld>
             <a:endParaRPr lang="de-CH"/>
           </a:p>
@@ -418,7 +429,7 @@
           <a:p>
             <a:fld id="{F3305D74-5386-41FC-BB92-843EF180690E}" type="datetimeFigureOut">
               <a:rPr lang="de-CH" smtClean="0"/>
-              <a:t>27.09.2015</a:t>
+              <a:t>28.09.2015</a:t>
             </a:fld>
             <a:endParaRPr lang="de-CH"/>
           </a:p>
@@ -598,7 +609,7 @@
           <a:p>
             <a:fld id="{F3305D74-5386-41FC-BB92-843EF180690E}" type="datetimeFigureOut">
               <a:rPr lang="de-CH" smtClean="0"/>
-              <a:t>27.09.2015</a:t>
+              <a:t>28.09.2015</a:t>
             </a:fld>
             <a:endParaRPr lang="de-CH"/>
           </a:p>
@@ -768,7 +779,7 @@
           <a:p>
             <a:fld id="{F3305D74-5386-41FC-BB92-843EF180690E}" type="datetimeFigureOut">
               <a:rPr lang="de-CH" smtClean="0"/>
-              <a:t>27.09.2015</a:t>
+              <a:t>28.09.2015</a:t>
             </a:fld>
             <a:endParaRPr lang="de-CH"/>
           </a:p>
@@ -1014,7 +1025,7 @@
           <a:p>
             <a:fld id="{F3305D74-5386-41FC-BB92-843EF180690E}" type="datetimeFigureOut">
               <a:rPr lang="de-CH" smtClean="0"/>
-              <a:t>27.09.2015</a:t>
+              <a:t>28.09.2015</a:t>
             </a:fld>
             <a:endParaRPr lang="de-CH"/>
           </a:p>
@@ -1246,7 +1257,7 @@
           <a:p>
             <a:fld id="{F3305D74-5386-41FC-BB92-843EF180690E}" type="datetimeFigureOut">
               <a:rPr lang="de-CH" smtClean="0"/>
-              <a:t>27.09.2015</a:t>
+              <a:t>28.09.2015</a:t>
             </a:fld>
             <a:endParaRPr lang="de-CH"/>
           </a:p>
@@ -1613,7 +1624,7 @@
           <a:p>
             <a:fld id="{F3305D74-5386-41FC-BB92-843EF180690E}" type="datetimeFigureOut">
               <a:rPr lang="de-CH" smtClean="0"/>
-              <a:t>27.09.2015</a:t>
+              <a:t>28.09.2015</a:t>
             </a:fld>
             <a:endParaRPr lang="de-CH"/>
           </a:p>
@@ -1731,7 +1742,7 @@
           <a:p>
             <a:fld id="{F3305D74-5386-41FC-BB92-843EF180690E}" type="datetimeFigureOut">
               <a:rPr lang="de-CH" smtClean="0"/>
-              <a:t>27.09.2015</a:t>
+              <a:t>28.09.2015</a:t>
             </a:fld>
             <a:endParaRPr lang="de-CH"/>
           </a:p>
@@ -1826,7 +1837,7 @@
           <a:p>
             <a:fld id="{F3305D74-5386-41FC-BB92-843EF180690E}" type="datetimeFigureOut">
               <a:rPr lang="de-CH" smtClean="0"/>
-              <a:t>27.09.2015</a:t>
+              <a:t>28.09.2015</a:t>
             </a:fld>
             <a:endParaRPr lang="de-CH"/>
           </a:p>
@@ -2103,7 +2114,7 @@
           <a:p>
             <a:fld id="{F3305D74-5386-41FC-BB92-843EF180690E}" type="datetimeFigureOut">
               <a:rPr lang="de-CH" smtClean="0"/>
-              <a:t>27.09.2015</a:t>
+              <a:t>28.09.2015</a:t>
             </a:fld>
             <a:endParaRPr lang="de-CH"/>
           </a:p>
@@ -2356,7 +2367,7 @@
           <a:p>
             <a:fld id="{F3305D74-5386-41FC-BB92-843EF180690E}" type="datetimeFigureOut">
               <a:rPr lang="de-CH" smtClean="0"/>
-              <a:t>27.09.2015</a:t>
+              <a:t>28.09.2015</a:t>
             </a:fld>
             <a:endParaRPr lang="de-CH"/>
           </a:p>
@@ -2569,7 +2580,7 @@
           <a:p>
             <a:fld id="{F3305D74-5386-41FC-BB92-843EF180690E}" type="datetimeFigureOut">
               <a:rPr lang="de-CH" smtClean="0"/>
-              <a:t>27.09.2015</a:t>
+              <a:t>28.09.2015</a:t>
             </a:fld>
             <a:endParaRPr lang="de-CH"/>
           </a:p>
@@ -3497,7 +3508,17 @@
           <a:p>
             <a:r>
               <a:rPr lang="de-CH" dirty="0" smtClean="0"/>
-              <a:t>Informationen schnell zur Verfügung stellen</a:t>
+              <a:t>Zentrale Verwaltung zwischen Institutionen </a:t>
+            </a:r>
+          </a:p>
+          <a:p>
+            <a:r>
+              <a:rPr lang="de-CH" dirty="0" smtClean="0"/>
+              <a:t>Informationen </a:t>
+            </a:r>
+            <a:r>
+              <a:rPr lang="de-CH" dirty="0" smtClean="0"/>
+              <a:t>schnell zur Verfügung stellen</a:t>
             </a:r>
           </a:p>
           <a:p>
@@ -3521,14 +3542,17 @@
           <a:p>
             <a:r>
               <a:rPr lang="de-CH" dirty="0" smtClean="0"/>
-              <a:t>Termine verwalten (Sekretärin)</a:t>
-            </a:r>
-          </a:p>
-          <a:p>
+              <a:t>Arzt </a:t>
+            </a:r>
             <a:r>
               <a:rPr lang="de-CH" dirty="0" smtClean="0"/>
-              <a:t>Arzt und Klinik Verfügbarkeit</a:t>
-            </a:r>
+              <a:t>und Klinik </a:t>
+            </a:r>
+            <a:r>
+              <a:rPr lang="de-CH" dirty="0" smtClean="0"/>
+              <a:t>Verfügbarkeit (Terminplanung)</a:t>
+            </a:r>
+            <a:endParaRPr lang="de-CH" dirty="0" smtClean="0"/>
           </a:p>
           <a:p>
             <a:endParaRPr lang="de-CH" dirty="0"/>
@@ -3794,23 +3818,23 @@
             <a:spLocks noGrp="1"/>
           </p:cNvSpPr>
           <p:nvPr>
-            <p:ph type="title"/>
-          </p:nvPr>
-        </p:nvSpPr>
-        <p:spPr/>
-        <p:txBody>
-          <a:bodyPr/>
-          <a:lstStyle/>
-          <a:p>
-            <a:r>
-              <a:rPr lang="de-CH" b="1" dirty="0" smtClean="0">
+            <p:ph type="ctrTitle"/>
+          </p:nvPr>
+        </p:nvSpPr>
+        <p:spPr/>
+        <p:txBody>
+          <a:bodyPr/>
+          <a:lstStyle/>
+          <a:p>
+            <a:r>
+              <a:rPr lang="de-CH" dirty="0" smtClean="0">
                 <a:solidFill>
                   <a:srgbClr val="00B050"/>
                 </a:solidFill>
               </a:rPr>
-              <a:t>Fragen?</a:t>
-            </a:r>
-            <a:endParaRPr lang="de-CH" b="1" dirty="0">
+              <a:t>Danke für Ihre Aufmerksamkeit</a:t>
+            </a:r>
+            <a:endParaRPr lang="de-CH" dirty="0">
               <a:solidFill>
                 <a:srgbClr val="00B050"/>
               </a:solidFill>
@@ -3820,57 +3844,33 @@
       </p:sp>
       <p:sp>
         <p:nvSpPr>
-          <p:cNvPr id="3" name="Inhaltsplatzhalter 2"/>
-          <p:cNvSpPr>
-            <a:spLocks noGrp="1"/>
-          </p:cNvSpPr>
-          <p:nvPr>
-            <p:ph idx="1"/>
-          </p:nvPr>
-        </p:nvSpPr>
-        <p:spPr/>
-        <p:txBody>
-          <a:bodyPr>
-            <a:normAutofit/>
-          </a:bodyPr>
-          <a:lstStyle/>
-          <a:p>
-            <a:pPr marL="457200" lvl="1" indent="0">
-              <a:buNone/>
-            </a:pPr>
-            <a:endParaRPr lang="de-CH" dirty="0" smtClean="0"/>
-          </a:p>
-          <a:p>
-            <a:pPr marL="457200" lvl="1" indent="0">
-              <a:buNone/>
-            </a:pPr>
-            <a:endParaRPr lang="de-CH" dirty="0" smtClean="0"/>
-          </a:p>
-          <a:p>
-            <a:pPr marL="457200" lvl="1" indent="0">
-              <a:buNone/>
-            </a:pPr>
-            <a:endParaRPr lang="de-CH" dirty="0"/>
+          <p:cNvPr id="3" name="Untertitel 2"/>
+          <p:cNvSpPr>
+            <a:spLocks noGrp="1"/>
+          </p:cNvSpPr>
+          <p:nvPr>
+            <p:ph type="subTitle" idx="1"/>
+          </p:nvPr>
+        </p:nvSpPr>
+        <p:spPr/>
+        <p:txBody>
+          <a:bodyPr/>
+          <a:lstStyle/>
+          <a:p>
+            <a:endParaRPr lang="de-CH"/>
           </a:p>
         </p:txBody>
       </p:sp>
     </p:spTree>
     <p:extLst>
       <p:ext uri="{BB962C8B-B14F-4D97-AF65-F5344CB8AC3E}">
-        <p14:creationId xmlns:p14="http://schemas.microsoft.com/office/powerpoint/2010/main" val="2469735590"/>
+        <p14:creationId xmlns:p14="http://schemas.microsoft.com/office/powerpoint/2010/main" val="2781325947"/>
       </p:ext>
     </p:extLst>
   </p:cSld>
   <p:clrMapOvr>
     <a:masterClrMapping/>
   </p:clrMapOvr>
-  <p:timing>
-    <p:tnLst>
-      <p:par>
-        <p:cTn id="1" dur="indefinite" restart="never" nodeType="tmRoot"/>
-      </p:par>
-    </p:tnLst>
-  </p:timing>
 </p:sld>
 </file>
 
@@ -4129,7 +4129,7 @@
   <a:extraClrSchemeLst/>
   <a:extLst>
     <a:ext uri="{05A4C25C-085E-4340-85A3-A5531E510DB2}">
-      <thm15:themeFamily xmlns:thm15="http://schemas.microsoft.com/office/thememl/2012/main" xmlns="" name="Office Theme" id="{62F939B6-93AF-4DB8-9C6B-D6C7DFDC589F}" vid="{4A3C46E8-61CC-4603-A589-7422A47A8E4A}"/>
+      <thm15:themeFamily xmlns:thm15="http://schemas.microsoft.com/office/thememl/2012/main" name="Office Theme" id="{62F939B6-93AF-4DB8-9C6B-D6C7DFDC589F}" vid="{4A3C46E8-61CC-4603-A589-7422A47A8E4A}"/>
     </a:ext>
   </a:extLst>
 </a:theme>

</xml_diff>